<commit_message>
Update - Arg. pattern, Figs, Text
- Argument Pattern paragraph in Stage 1, references to argument pattern in other Stages
- Fig 8 and Fig 10 - updated to address Suet's points
- Improved Text, fixed a few Typos
- Added James Summary Paragraph
</commit_message>
<xml_diff>
--- a/source/figures/Figs_Artwork_2023-01-26.pptx
+++ b/source/figures/Figs_Artwork_2023-01-26.pptx
@@ -205,7 +205,7 @@
           <a:p>
             <a:fld id="{417EA9ED-6453-884B-961A-08945DD77513}" type="datetimeFigureOut">
               <a:rPr lang="en-GB" smtClean="0"/>
-              <a:t>26/01/2023</a:t>
+              <a:t>30/01/2023</a:t>
             </a:fld>
             <a:endParaRPr lang="en-GB"/>
           </a:p>
@@ -2487,7 +2487,7 @@
           <a:p>
             <a:fld id="{EAB2B32C-6456-694A-B1E0-FE9645974ECB}" type="datetimeFigureOut">
               <a:rPr lang="en-GB" smtClean="0"/>
-              <a:t>26/01/2023</a:t>
+              <a:t>30/01/2023</a:t>
             </a:fld>
             <a:endParaRPr lang="en-GB"/>
           </a:p>
@@ -2685,7 +2685,7 @@
           <a:p>
             <a:fld id="{EAB2B32C-6456-694A-B1E0-FE9645974ECB}" type="datetimeFigureOut">
               <a:rPr lang="en-GB" smtClean="0"/>
-              <a:t>26/01/2023</a:t>
+              <a:t>30/01/2023</a:t>
             </a:fld>
             <a:endParaRPr lang="en-GB"/>
           </a:p>
@@ -2893,7 +2893,7 @@
           <a:p>
             <a:fld id="{EAB2B32C-6456-694A-B1E0-FE9645974ECB}" type="datetimeFigureOut">
               <a:rPr lang="en-GB" smtClean="0"/>
-              <a:t>26/01/2023</a:t>
+              <a:t>30/01/2023</a:t>
             </a:fld>
             <a:endParaRPr lang="en-GB"/>
           </a:p>
@@ -3091,7 +3091,7 @@
           <a:p>
             <a:fld id="{EAB2B32C-6456-694A-B1E0-FE9645974ECB}" type="datetimeFigureOut">
               <a:rPr lang="en-GB" smtClean="0"/>
-              <a:t>26/01/2023</a:t>
+              <a:t>30/01/2023</a:t>
             </a:fld>
             <a:endParaRPr lang="en-GB"/>
           </a:p>
@@ -3366,7 +3366,7 @@
           <a:p>
             <a:fld id="{EAB2B32C-6456-694A-B1E0-FE9645974ECB}" type="datetimeFigureOut">
               <a:rPr lang="en-GB" smtClean="0"/>
-              <a:t>26/01/2023</a:t>
+              <a:t>30/01/2023</a:t>
             </a:fld>
             <a:endParaRPr lang="en-GB"/>
           </a:p>
@@ -3631,7 +3631,7 @@
           <a:p>
             <a:fld id="{EAB2B32C-6456-694A-B1E0-FE9645974ECB}" type="datetimeFigureOut">
               <a:rPr lang="en-GB" smtClean="0"/>
-              <a:t>26/01/2023</a:t>
+              <a:t>30/01/2023</a:t>
             </a:fld>
             <a:endParaRPr lang="en-GB"/>
           </a:p>
@@ -4043,7 +4043,7 @@
           <a:p>
             <a:fld id="{EAB2B32C-6456-694A-B1E0-FE9645974ECB}" type="datetimeFigureOut">
               <a:rPr lang="en-GB" smtClean="0"/>
-              <a:t>26/01/2023</a:t>
+              <a:t>30/01/2023</a:t>
             </a:fld>
             <a:endParaRPr lang="en-GB"/>
           </a:p>
@@ -4184,7 +4184,7 @@
           <a:p>
             <a:fld id="{EAB2B32C-6456-694A-B1E0-FE9645974ECB}" type="datetimeFigureOut">
               <a:rPr lang="en-GB" smtClean="0"/>
-              <a:t>26/01/2023</a:t>
+              <a:t>30/01/2023</a:t>
             </a:fld>
             <a:endParaRPr lang="en-GB"/>
           </a:p>
@@ -4297,7 +4297,7 @@
           <a:p>
             <a:fld id="{EAB2B32C-6456-694A-B1E0-FE9645974ECB}" type="datetimeFigureOut">
               <a:rPr lang="en-GB" smtClean="0"/>
-              <a:t>26/01/2023</a:t>
+              <a:t>30/01/2023</a:t>
             </a:fld>
             <a:endParaRPr lang="en-GB"/>
           </a:p>
@@ -4608,7 +4608,7 @@
           <a:p>
             <a:fld id="{EAB2B32C-6456-694A-B1E0-FE9645974ECB}" type="datetimeFigureOut">
               <a:rPr lang="en-GB" smtClean="0"/>
-              <a:t>26/01/2023</a:t>
+              <a:t>30/01/2023</a:t>
             </a:fld>
             <a:endParaRPr lang="en-GB"/>
           </a:p>
@@ -4896,7 +4896,7 @@
           <a:p>
             <a:fld id="{EAB2B32C-6456-694A-B1E0-FE9645974ECB}" type="datetimeFigureOut">
               <a:rPr lang="en-GB" smtClean="0"/>
-              <a:t>26/01/2023</a:t>
+              <a:t>30/01/2023</a:t>
             </a:fld>
             <a:endParaRPr lang="en-GB"/>
           </a:p>
@@ -5137,7 +5137,7 @@
           <a:p>
             <a:fld id="{EAB2B32C-6456-694A-B1E0-FE9645974ECB}" type="datetimeFigureOut">
               <a:rPr lang="en-GB" smtClean="0"/>
-              <a:t>26/01/2023</a:t>
+              <a:t>30/01/2023</a:t>
             </a:fld>
             <a:endParaRPr lang="en-GB"/>
           </a:p>
@@ -17668,8 +17668,8 @@
         </p:nvSpPr>
         <p:spPr>
           <a:xfrm>
-            <a:off x="6631060" y="2195552"/>
-            <a:ext cx="1432336" cy="593624"/>
+            <a:off x="6631097" y="2252025"/>
+            <a:ext cx="1432336" cy="439736"/>
           </a:xfrm>
           <a:prstGeom prst="rect">
             <a:avLst/>
@@ -17689,7 +17689,7 @@
             </a:pPr>
             <a:r>
               <a:rPr lang="en-GB" sz="1400" dirty="0"/>
-              <a:t>[N] Individual Agent Sensing Capabilities</a:t>
+              <a:t>[N] Test Environment</a:t>
             </a:r>
             <a:endParaRPr lang="en-GB" sz="1400" dirty="0">
               <a:cs typeface="Arial"/>
@@ -17942,10 +17942,10 @@
       </p:sp>
       <p:pic>
         <p:nvPicPr>
-          <p:cNvPr id="6" name="Picture 5">
+          <p:cNvPr id="2" name="Picture 1">
             <a:extLst>
               <a:ext uri="{FF2B5EF4-FFF2-40B4-BE49-F238E27FC236}">
-                <a16:creationId xmlns:a16="http://schemas.microsoft.com/office/drawing/2014/main" id="{3C5445FC-1E7E-F3DF-DD03-046E63731AEC}"/>
+                <a16:creationId xmlns:a16="http://schemas.microsoft.com/office/drawing/2014/main" id="{B123F754-F179-881D-E213-00F448ACBEC1}"/>
               </a:ext>
             </a:extLst>
           </p:cNvPr>
@@ -17954,16 +17954,15 @@
           </p:cNvPicPr>
           <p:nvPr/>
         </p:nvPicPr>
-        <p:blipFill>
+        <p:blipFill rotWithShape="1">
           <a:blip r:embed="rId3"/>
-          <a:stretch>
-            <a:fillRect/>
-          </a:stretch>
+          <a:srcRect l="438" b="259"/>
+          <a:stretch/>
         </p:blipFill>
         <p:spPr>
           <a:xfrm>
-            <a:off x="4840511" y="-3121160"/>
-            <a:ext cx="9875970" cy="6858000"/>
+            <a:off x="1791770" y="-1638445"/>
+            <a:ext cx="9832696" cy="6840207"/>
           </a:xfrm>
           <a:prstGeom prst="rect">
             <a:avLst/>
@@ -19742,10 +19741,10 @@
         </p:nvGrpSpPr>
         <p:grpSpPr>
           <a:xfrm>
-            <a:off x="1057091" y="1680123"/>
-            <a:ext cx="5821494" cy="3497753"/>
-            <a:chOff x="6212186" y="1692434"/>
-            <a:chExt cx="5821494" cy="3497753"/>
+            <a:off x="1049594" y="1680123"/>
+            <a:ext cx="5828991" cy="3497753"/>
+            <a:chOff x="6204689" y="1692434"/>
+            <a:chExt cx="5828991" cy="3497753"/>
           </a:xfrm>
         </p:grpSpPr>
         <p:cxnSp>
@@ -21599,8 +21598,8 @@
           </p:nvSpPr>
           <p:spPr>
             <a:xfrm>
-              <a:off x="6231952" y="1943739"/>
-              <a:ext cx="1290994" cy="264688"/>
+              <a:off x="6204689" y="1841905"/>
+              <a:ext cx="1290994" cy="431400"/>
             </a:xfrm>
             <a:prstGeom prst="rect">
               <a:avLst/>
@@ -21620,7 +21619,7 @@
               </a:pPr>
               <a:r>
                 <a:rPr lang="en-GB" sz="1400" dirty="0"/>
-                <a:t>[V] EB Model</a:t>
+                <a:t>[V] EB Algorithm</a:t>
               </a:r>
             </a:p>
           </p:txBody>
@@ -21892,10 +21891,10 @@
       </p:sp>
       <p:pic>
         <p:nvPicPr>
-          <p:cNvPr id="2" name="Picture 1">
+          <p:cNvPr id="3" name="Picture 2">
             <a:extLst>
               <a:ext uri="{FF2B5EF4-FFF2-40B4-BE49-F238E27FC236}">
-                <a16:creationId xmlns:a16="http://schemas.microsoft.com/office/drawing/2014/main" id="{2C2F9DE4-F808-8DDF-ED1C-5A47C869CE7E}"/>
+                <a16:creationId xmlns:a16="http://schemas.microsoft.com/office/drawing/2014/main" id="{CE0E9041-5C65-4E8B-80A1-66E4071DE76B}"/>
               </a:ext>
             </a:extLst>
           </p:cNvPr>
@@ -21906,13 +21905,13 @@
         </p:nvPicPr>
         <p:blipFill rotWithShape="1">
           <a:blip r:embed="rId3"/>
-          <a:srcRect t="945"/>
+          <a:srcRect l="66" t="742" r="98"/>
           <a:stretch/>
         </p:blipFill>
         <p:spPr>
           <a:xfrm>
-            <a:off x="4546866" y="-101601"/>
-            <a:ext cx="10715625" cy="6793255"/>
+            <a:off x="2993371" y="-2036717"/>
+            <a:ext cx="10724030" cy="6807065"/>
           </a:xfrm>
           <a:prstGeom prst="rect">
             <a:avLst/>

</xml_diff>